<commit_message>
PT #88870022 - Modified the BatchDatabaseCollectionReader to continue batch processing when blank batches are returned until the number of batches have been exhausted. Cleaned up the batch checking logic. SQLServerPagedDatabaseCollectionReader could not be modified to accommodate this change because there is no set number of batches. By definition when a query is empty we have reached the end of the number of rows in the view/table. Recommend we add a feature for an upper limit on the number of batches in order to be able to split data between multiple clients.
</commit_message>
<xml_diff>
--- a/src/site/resources/presentations/Framework_for_Rapid_Development.pptx
+++ b/src/site/resources/presentations/Framework_for_Rapid_Development.pptx
@@ -215,7 +215,7 @@
           <a:p>
             <a:fld id="{8F306F4F-2C56-854D-9151-D5568BECB391}" type="datetimeFigureOut">
               <a:rPr lang="en-US" smtClean="0"/>
-              <a:t>12/3/14</a:t>
+              <a:t>3/19/15</a:t>
             </a:fld>
             <a:endParaRPr lang="en-US"/>
           </a:p>
@@ -947,7 +947,7 @@
             <a:fld id="{C271E495-FD0A-4E65-AE46-D35AC9636DCF}" type="datetime1">
               <a:rPr lang="en-US"/>
               <a:pPr/>
-              <a:t>12/3/14</a:t>
+              <a:t>3/19/15</a:t>
             </a:fld>
             <a:endParaRPr lang="en-US"/>
           </a:p>
@@ -1129,7 +1129,7 @@
             <a:fld id="{A76F1133-00A1-4C69-950F-D1E8F0511CDD}" type="datetime1">
               <a:rPr lang="en-US"/>
               <a:pPr/>
-              <a:t>12/3/14</a:t>
+              <a:t>3/19/15</a:t>
             </a:fld>
             <a:endParaRPr lang="en-US"/>
           </a:p>
@@ -1321,7 +1321,7 @@
             <a:fld id="{FC1E2A9B-A576-46ED-A409-75DB7C861D0B}" type="datetime1">
               <a:rPr lang="en-US"/>
               <a:pPr/>
-              <a:t>12/3/14</a:t>
+              <a:t>3/19/15</a:t>
             </a:fld>
             <a:endParaRPr lang="en-US"/>
           </a:p>
@@ -1528,7 +1528,7 @@
             <a:fld id="{96DE1AE7-EF95-406E-80EF-0091139C2847}" type="datetime1">
               <a:rPr lang="en-US"/>
               <a:pPr/>
-              <a:t>12/3/14</a:t>
+              <a:t>3/19/15</a:t>
             </a:fld>
             <a:endParaRPr lang="en-US"/>
           </a:p>
@@ -1810,7 +1810,7 @@
             <a:fld id="{1AB5803D-E300-40F1-A06A-0ADAB3A87FD8}" type="datetime1">
               <a:rPr lang="en-US"/>
               <a:pPr/>
-              <a:t>12/3/14</a:t>
+              <a:t>3/19/15</a:t>
             </a:fld>
             <a:endParaRPr lang="en-US"/>
           </a:p>
@@ -2110,7 +2110,7 @@
             <a:fld id="{09652C68-FECA-40FE-B8BC-CC4A006AFC3D}" type="datetime1">
               <a:rPr lang="en-US"/>
               <a:pPr/>
-              <a:t>12/3/14</a:t>
+              <a:t>3/19/15</a:t>
             </a:fld>
             <a:endParaRPr lang="en-US"/>
           </a:p>
@@ -2544,7 +2544,7 @@
             <a:fld id="{F5063447-8492-44EC-B64F-DAB8BF106FFD}" type="datetime1">
               <a:rPr lang="en-US"/>
               <a:pPr/>
-              <a:t>12/3/14</a:t>
+              <a:t>3/19/15</a:t>
             </a:fld>
             <a:endParaRPr lang="en-US"/>
           </a:p>
@@ -2674,7 +2674,7 @@
             <a:fld id="{22AA1E23-7AC8-4759-8BF3-7B1E0192BACF}" type="datetime1">
               <a:rPr lang="en-US"/>
               <a:pPr/>
-              <a:t>12/3/14</a:t>
+              <a:t>3/19/15</a:t>
             </a:fld>
             <a:endParaRPr lang="en-US"/>
           </a:p>
@@ -2781,7 +2781,7 @@
             <a:fld id="{D9FCC948-6689-4C48-BBAA-2772D02AC501}" type="datetime1">
               <a:rPr lang="en-US"/>
               <a:pPr/>
-              <a:t>12/3/14</a:t>
+              <a:t>3/19/15</a:t>
             </a:fld>
             <a:endParaRPr lang="en-US"/>
           </a:p>
@@ -3070,7 +3070,7 @@
             <a:fld id="{B619E64F-CF78-487F-9255-CA1615AE934A}" type="datetime1">
               <a:rPr lang="en-US"/>
               <a:pPr/>
-              <a:t>12/3/14</a:t>
+              <a:t>3/19/15</a:t>
             </a:fld>
             <a:endParaRPr lang="en-US"/>
           </a:p>
@@ -3342,7 +3342,7 @@
             <a:fld id="{1CF8F4E4-BA13-4EAB-A411-EB932F01F199}" type="datetime1">
               <a:rPr lang="en-US"/>
               <a:pPr/>
-              <a:t>12/3/14</a:t>
+              <a:t>3/19/15</a:t>
             </a:fld>
             <a:endParaRPr lang="en-US"/>
           </a:p>
@@ -3590,7 +3590,7 @@
             <a:fld id="{E083146E-487B-426A-B8AF-88A9B28F3C16}" type="datetime1">
               <a:rPr lang="en-US"/>
               <a:pPr/>
-              <a:t>12/3/14</a:t>
+              <a:t>3/19/15</a:t>
             </a:fld>
             <a:endParaRPr lang="en-US"/>
           </a:p>
@@ -16546,43 +16546,102 @@
             <p:ph type="title"/>
           </p:nvPr>
         </p:nvSpPr>
-        <p:spPr/>
+        <p:spPr>
+          <a:xfrm>
+            <a:off x="880496" y="149259"/>
+            <a:ext cx="8229600" cy="639762"/>
+          </a:xfrm>
+        </p:spPr>
         <p:txBody>
           <a:bodyPr/>
           <a:lstStyle/>
           <a:p>
             <a:r>
               <a:rPr lang="en-US" dirty="0" smtClean="0"/>
-              <a:t>Current Release 2013.11.1</a:t>
+              <a:t>Release and Documentation</a:t>
             </a:r>
             <a:endParaRPr lang="en-US" dirty="0"/>
           </a:p>
         </p:txBody>
       </p:sp>
-      <p:pic>
-        <p:nvPicPr>
-          <p:cNvPr id="4" name="Picture 3"/>
-          <p:cNvPicPr>
-            <a:picLocks noChangeAspect="1"/>
-          </p:cNvPicPr>
+      <p:sp>
+        <p:nvSpPr>
+          <p:cNvPr id="3" name="Rectangle 2"/>
+          <p:cNvSpPr/>
           <p:nvPr/>
-        </p:nvPicPr>
-        <p:blipFill>
-          <a:blip r:embed="rId2"/>
-          <a:stretch>
-            <a:fillRect/>
-          </a:stretch>
-        </p:blipFill>
+        </p:nvSpPr>
         <p:spPr>
           <a:xfrm>
-            <a:off x="2743200" y="1625600"/>
-            <a:ext cx="3657600" cy="3594100"/>
+            <a:off x="989634" y="1729935"/>
+            <a:ext cx="7317681" cy="369332"/>
           </a:xfrm>
           <a:prstGeom prst="rect">
             <a:avLst/>
           </a:prstGeom>
         </p:spPr>
-      </p:pic>
+        <p:txBody>
+          <a:bodyPr wrap="square">
+            <a:spAutoFit/>
+          </a:bodyPr>
+          <a:lstStyle/>
+          <a:p>
+            <a:r>
+              <a:rPr lang="en-US" u="sng" dirty="0"/>
+              <a:t>http://department-of-veterans-</a:t>
+            </a:r>
+            <a:r>
+              <a:rPr lang="en-US" u="sng" dirty="0" err="1"/>
+              <a:t>affairs.github.io</a:t>
+            </a:r>
+            <a:r>
+              <a:rPr lang="en-US" u="sng" dirty="0"/>
+              <a:t>/Leo/</a:t>
+            </a:r>
+            <a:r>
+              <a:rPr lang="en-US" u="sng" dirty="0" err="1"/>
+              <a:t>index.html</a:t>
+            </a:r>
+            <a:endParaRPr lang="en-US" dirty="0"/>
+          </a:p>
+        </p:txBody>
+      </p:sp>
+      <p:sp>
+        <p:nvSpPr>
+          <p:cNvPr id="5" name="Rectangle 4"/>
+          <p:cNvSpPr/>
+          <p:nvPr/>
+        </p:nvSpPr>
+        <p:spPr>
+          <a:xfrm>
+            <a:off x="989634" y="2603102"/>
+            <a:ext cx="6021315" cy="369332"/>
+          </a:xfrm>
+          <a:prstGeom prst="rect">
+            <a:avLst/>
+          </a:prstGeom>
+        </p:spPr>
+        <p:txBody>
+          <a:bodyPr wrap="square">
+            <a:spAutoFit/>
+          </a:bodyPr>
+          <a:lstStyle/>
+          <a:p>
+            <a:r>
+              <a:rPr lang="en-US" u="sng" dirty="0"/>
+              <a:t>https://</a:t>
+            </a:r>
+            <a:r>
+              <a:rPr lang="en-US" u="sng" dirty="0" err="1"/>
+              <a:t>github.com</a:t>
+            </a:r>
+            <a:r>
+              <a:rPr lang="en-US" u="sng" dirty="0"/>
+              <a:t>/department-of-veterans-affairs/Leo</a:t>
+            </a:r>
+            <a:endParaRPr lang="en-US" dirty="0"/>
+          </a:p>
+        </p:txBody>
+      </p:sp>
     </p:spTree>
     <p:extLst>
       <p:ext uri="{BB962C8B-B14F-4D97-AF65-F5344CB8AC3E}">

</xml_diff>